<commit_message>
add readme and poster
</commit_message>
<xml_diff>
--- a/report/Poster RL Project_condor.pptx
+++ b/report/Poster RL Project_condor.pptx
@@ -16362,7 +16362,7 @@
         </p:nvSpPr>
         <p:spPr>
           <a:xfrm>
-            <a:off x="207054" y="16657943"/>
+            <a:off x="207054" y="17321619"/>
             <a:ext cx="7404300" cy="2194386"/>
           </a:xfrm>
           <a:prstGeom prst="rect">
@@ -17104,7 +17104,7 @@
         </p:nvGrpSpPr>
         <p:grpSpPr>
           <a:xfrm>
-            <a:off x="596859" y="16076392"/>
+            <a:off x="596859" y="16645352"/>
             <a:ext cx="2686134" cy="461623"/>
             <a:chOff x="579191" y="23147652"/>
             <a:chExt cx="4029000" cy="692400"/>
@@ -18220,7 +18220,7 @@
         <p:spPr>
           <a:xfrm>
             <a:off x="496695" y="10505538"/>
-            <a:ext cx="7631391" cy="5546073"/>
+            <a:ext cx="7631391" cy="5850772"/>
           </a:xfrm>
           <a:prstGeom prst="rect">
             <a:avLst/>
@@ -18235,6 +18235,19 @@
             <a:spAutoFit/>
           </a:bodyPr>
           <a:lstStyle/>
+          <a:p>
+            <a:pPr lvl="0" algn="just">
+              <a:lnSpc>
+                <a:spcPct val="110000"/>
+              </a:lnSpc>
+            </a:pPr>
+            <a:endParaRPr lang="en-US" sz="1800" b="1" dirty="0">
+              <a:solidFill>
+                <a:schemeClr val="dk1"/>
+              </a:solidFill>
+              <a:latin typeface="Titillium Web"/>
+            </a:endParaRPr>
+          </a:p>
           <a:p>
             <a:pPr lvl="0" algn="just">
               <a:lnSpc>

</xml_diff>